<commit_message>
The 3rd revision of the Presentation
</commit_message>
<xml_diff>
--- a/FCSD-CUDA project/Presentation/CCECE2015 Presentation Tianpei Chen.pptx
+++ b/FCSD-CUDA project/Presentation/CCECE2015 Presentation Tianpei Chen.pptx
@@ -539,7 +539,7 @@
           <a:p>
             <a:fld id="{86AAA597-3CBE-49BE-8D08-3F528AF3AB5A}" type="datetime1">
               <a:rPr lang="en-CA" smtClean="0"/>
-              <a:t>2015-05-02</a:t>
+              <a:t>2015-05-04</a:t>
             </a:fld>
             <a:endParaRPr lang="en-CA"/>
           </a:p>
@@ -709,7 +709,7 @@
           <a:p>
             <a:fld id="{679C1C61-6D04-4AD0-936C-EA56DD1AF490}" type="datetime1">
               <a:rPr lang="en-CA" smtClean="0"/>
-              <a:t>2015-05-02</a:t>
+              <a:t>2015-05-04</a:t>
             </a:fld>
             <a:endParaRPr lang="en-CA"/>
           </a:p>
@@ -1066,7 +1066,7 @@
           <a:p>
             <a:fld id="{17B4C500-9812-4979-AA80-671BB24E40C0}" type="datetime1">
               <a:rPr lang="en-CA" smtClean="0"/>
-              <a:t>2015-05-02</a:t>
+              <a:t>2015-05-04</a:t>
             </a:fld>
             <a:endParaRPr lang="en-CA"/>
           </a:p>
@@ -1150,7 +1150,7 @@
           <a:p>
             <a:fld id="{88029715-C214-4152-9116-9871D4A13A88}" type="datetime1">
               <a:rPr lang="en-CA" smtClean="0"/>
-              <a:t>2015-05-02</a:t>
+              <a:t>2015-05-04</a:t>
             </a:fld>
             <a:endParaRPr lang="en-CA"/>
           </a:p>
@@ -1257,7 +1257,7 @@
           <a:p>
             <a:fld id="{88029715-C214-4152-9116-9871D4A13A88}" type="datetime1">
               <a:rPr lang="en-CA" smtClean="0"/>
-              <a:t>2015-05-02</a:t>
+              <a:t>2015-05-04</a:t>
             </a:fld>
             <a:endParaRPr lang="en-CA"/>
           </a:p>
@@ -1364,7 +1364,7 @@
           <a:p>
             <a:fld id="{88029715-C214-4152-9116-9871D4A13A88}" type="datetime1">
               <a:rPr lang="en-CA" smtClean="0"/>
-              <a:t>2015-05-02</a:t>
+              <a:t>2015-05-04</a:t>
             </a:fld>
             <a:endParaRPr lang="en-CA"/>
           </a:p>
@@ -1471,7 +1471,7 @@
           <a:p>
             <a:fld id="{88029715-C214-4152-9116-9871D4A13A88}" type="datetime1">
               <a:rPr lang="en-CA" smtClean="0"/>
-              <a:t>2015-05-02</a:t>
+              <a:t>2015-05-04</a:t>
             </a:fld>
             <a:endParaRPr lang="en-CA"/>
           </a:p>
@@ -1578,7 +1578,7 @@
           <a:p>
             <a:fld id="{88029715-C214-4152-9116-9871D4A13A88}" type="datetime1">
               <a:rPr lang="en-CA" smtClean="0"/>
-              <a:t>2015-05-02</a:t>
+              <a:t>2015-05-04</a:t>
             </a:fld>
             <a:endParaRPr lang="en-CA"/>
           </a:p>
@@ -1685,7 +1685,7 @@
           <a:p>
             <a:fld id="{88029715-C214-4152-9116-9871D4A13A88}" type="datetime1">
               <a:rPr lang="en-CA" smtClean="0"/>
-              <a:t>2015-05-02</a:t>
+              <a:t>2015-05-04</a:t>
             </a:fld>
             <a:endParaRPr lang="en-CA"/>
           </a:p>
@@ -1792,7 +1792,7 @@
           <a:p>
             <a:fld id="{679C1C61-6D04-4AD0-936C-EA56DD1AF490}" type="datetime1">
               <a:rPr lang="en-CA" smtClean="0"/>
-              <a:t>2015-05-02</a:t>
+              <a:t>2015-05-04</a:t>
             </a:fld>
             <a:endParaRPr lang="en-CA"/>
           </a:p>
@@ -1899,7 +1899,7 @@
           <a:p>
             <a:fld id="{679C1C61-6D04-4AD0-936C-EA56DD1AF490}" type="datetime1">
               <a:rPr lang="en-CA" smtClean="0"/>
-              <a:t>2015-05-02</a:t>
+              <a:t>2015-05-04</a:t>
             </a:fld>
             <a:endParaRPr lang="en-CA"/>
           </a:p>
@@ -2006,7 +2006,7 @@
           <a:p>
             <a:fld id="{88029715-C214-4152-9116-9871D4A13A88}" type="datetime1">
               <a:rPr lang="en-CA" smtClean="0"/>
-              <a:t>2015-05-02</a:t>
+              <a:t>2015-05-04</a:t>
             </a:fld>
             <a:endParaRPr lang="en-CA"/>
           </a:p>
@@ -2113,7 +2113,7 @@
           <a:p>
             <a:fld id="{88029715-C214-4152-9116-9871D4A13A88}" type="datetime1">
               <a:rPr lang="en-CA" smtClean="0"/>
-              <a:t>2015-05-02</a:t>
+              <a:t>2015-05-04</a:t>
             </a:fld>
             <a:endParaRPr lang="en-CA"/>
           </a:p>
@@ -2286,7 +2286,7 @@
           <a:p>
             <a:fld id="{A2FE6A3A-5389-4506-B398-6E144F541E71}" type="datetime1">
               <a:rPr lang="en-CA" smtClean="0"/>
-              <a:t>2015-05-02</a:t>
+              <a:t>2015-05-04</a:t>
             </a:fld>
             <a:endParaRPr lang="en-CA"/>
           </a:p>
@@ -2456,7 +2456,7 @@
           <a:p>
             <a:fld id="{377524B7-1862-4C33-A67A-2D25D882F209}" type="datetime1">
               <a:rPr lang="en-CA" smtClean="0"/>
-              <a:t>2015-05-02</a:t>
+              <a:t>2015-05-04</a:t>
             </a:fld>
             <a:endParaRPr lang="en-CA"/>
           </a:p>
@@ -2636,7 +2636,7 @@
           <a:p>
             <a:fld id="{8C4F3776-8865-4AAA-8426-B61A26F413BC}" type="datetime1">
               <a:rPr lang="en-CA" smtClean="0"/>
-              <a:t>2015-05-02</a:t>
+              <a:t>2015-05-04</a:t>
             </a:fld>
             <a:endParaRPr lang="en-CA"/>
           </a:p>
@@ -2806,7 +2806,7 @@
           <a:p>
             <a:fld id="{D236E2CD-173A-496E-8CA7-67A0E62BE56F}" type="datetime1">
               <a:rPr lang="en-CA" smtClean="0"/>
-              <a:t>2015-05-02</a:t>
+              <a:t>2015-05-04</a:t>
             </a:fld>
             <a:endParaRPr lang="en-CA"/>
           </a:p>
@@ -3052,7 +3052,7 @@
           <a:p>
             <a:fld id="{FB8D1ED3-C2CD-41D5-85CC-0C3BACB6D324}" type="datetime1">
               <a:rPr lang="en-CA" smtClean="0"/>
-              <a:t>2015-05-02</a:t>
+              <a:t>2015-05-04</a:t>
             </a:fld>
             <a:endParaRPr lang="en-CA"/>
           </a:p>
@@ -3284,7 +3284,7 @@
           <a:p>
             <a:fld id="{89865F16-D273-48D9-A7A5-EC4DE369412A}" type="datetime1">
               <a:rPr lang="en-CA" smtClean="0"/>
-              <a:t>2015-05-02</a:t>
+              <a:t>2015-05-04</a:t>
             </a:fld>
             <a:endParaRPr lang="en-CA"/>
           </a:p>
@@ -3651,7 +3651,7 @@
           <a:p>
             <a:fld id="{66B2AD2B-FB5F-47F3-AB82-B3F5DD2D21D3}" type="datetime1">
               <a:rPr lang="en-CA" smtClean="0"/>
-              <a:t>2015-05-02</a:t>
+              <a:t>2015-05-04</a:t>
             </a:fld>
             <a:endParaRPr lang="en-CA"/>
           </a:p>
@@ -3769,7 +3769,7 @@
           <a:p>
             <a:fld id="{C7ED3C8F-BFFF-4A69-856D-DDB574521F36}" type="datetime1">
               <a:rPr lang="en-CA" smtClean="0"/>
-              <a:t>2015-05-02</a:t>
+              <a:t>2015-05-04</a:t>
             </a:fld>
             <a:endParaRPr lang="en-CA"/>
           </a:p>
@@ -3864,7 +3864,7 @@
           <a:p>
             <a:fld id="{5A5E6722-2054-41FE-884B-5B93836C64DB}" type="datetime1">
               <a:rPr lang="en-CA" smtClean="0"/>
-              <a:t>2015-05-02</a:t>
+              <a:t>2015-05-04</a:t>
             </a:fld>
             <a:endParaRPr lang="en-CA"/>
           </a:p>
@@ -4141,7 +4141,7 @@
           <a:p>
             <a:fld id="{45C830BA-B061-4B36-9062-402DE07CDF51}" type="datetime1">
               <a:rPr lang="en-CA" smtClean="0"/>
-              <a:t>2015-05-02</a:t>
+              <a:t>2015-05-04</a:t>
             </a:fld>
             <a:endParaRPr lang="en-CA"/>
           </a:p>
@@ -4394,7 +4394,7 @@
           <a:p>
             <a:fld id="{D55466AF-1B62-4C23-969B-6AADD3645219}" type="datetime1">
               <a:rPr lang="en-CA" smtClean="0"/>
-              <a:t>2015-05-02</a:t>
+              <a:t>2015-05-04</a:t>
             </a:fld>
             <a:endParaRPr lang="en-CA"/>
           </a:p>
@@ -4623,7 +4623,7 @@
           <a:p>
             <a:fld id="{955280E8-0776-4AB3-8C1B-CB8AE18E0AD6}" type="datetime1">
               <a:rPr lang="en-CA" smtClean="0"/>
-              <a:t>2015-05-02</a:t>
+              <a:t>2015-05-04</a:t>
             </a:fld>
             <a:endParaRPr lang="en-CA"/>
           </a:p>
@@ -7012,7 +7012,7 @@
           <a:p>
             <a:fld id="{049B54AE-E0CA-47A8-836E-86A3515991E5}" type="datetime1">
               <a:rPr lang="en-CA" smtClean="0"/>
-              <a:t>2015-05-02</a:t>
+              <a:t>2015-05-04</a:t>
             </a:fld>
             <a:endParaRPr lang="en-CA"/>
           </a:p>
@@ -7534,7 +7534,7 @@
           <a:p>
             <a:fld id="{049B54AE-E0CA-47A8-836E-86A3515991E5}" type="datetime1">
               <a:rPr lang="en-CA" smtClean="0"/>
-              <a:t>2015-05-02</a:t>
+              <a:t>2015-05-04</a:t>
             </a:fld>
             <a:endParaRPr lang="en-CA" dirty="0"/>
           </a:p>
@@ -8886,7 +8886,7 @@
           <a:p>
             <a:fld id="{049B54AE-E0CA-47A8-836E-86A3515991E5}" type="datetime1">
               <a:rPr lang="en-CA" smtClean="0"/>
-              <a:t>2015-05-02</a:t>
+              <a:t>2015-05-04</a:t>
             </a:fld>
             <a:endParaRPr lang="en-CA"/>
           </a:p>
@@ -9315,7 +9315,7 @@
           <a:p>
             <a:fld id="{DB95B0FB-F7EF-4DC6-930A-287826E433A5}" type="datetime1">
               <a:rPr lang="en-CA" smtClean="0"/>
-              <a:t>2015-05-02</a:t>
+              <a:t>2015-05-04</a:t>
             </a:fld>
             <a:endParaRPr lang="en-CA" dirty="0"/>
           </a:p>
@@ -10601,7 +10601,7 @@
           <a:p>
             <a:fld id="{049B54AE-E0CA-47A8-836E-86A3515991E5}" type="datetime1">
               <a:rPr lang="en-CA" smtClean="0"/>
-              <a:t>2015-05-02</a:t>
+              <a:t>2015-05-04</a:t>
             </a:fld>
             <a:endParaRPr lang="en-CA"/>
           </a:p>
@@ -10684,7 +10684,7 @@
           <a:p>
             <a:fld id="{049B54AE-E0CA-47A8-836E-86A3515991E5}" type="datetime1">
               <a:rPr lang="en-CA" smtClean="0"/>
-              <a:t>2015-05-02</a:t>
+              <a:t>2015-05-04</a:t>
             </a:fld>
             <a:endParaRPr lang="en-CA"/>
           </a:p>
@@ -10698,7 +10698,7 @@
         </p:nvSpPr>
         <p:spPr>
           <a:xfrm>
-            <a:off x="368345" y="1397741"/>
+            <a:off x="368345" y="1820826"/>
             <a:ext cx="3992639" cy="4431983"/>
           </a:xfrm>
           <a:prstGeom prst="rect">
@@ -10929,8 +10929,8 @@
         </p:nvSpPr>
         <p:spPr>
           <a:xfrm>
-            <a:off x="269873" y="841726"/>
-            <a:ext cx="4817660" cy="523220"/>
+            <a:off x="-57679" y="759838"/>
+            <a:ext cx="4817660" cy="1384995"/>
           </a:xfrm>
           <a:prstGeom prst="rect">
             <a:avLst/>
@@ -10944,21 +10944,23 @@
           <a:lstStyle/>
           <a:p>
             <a:r>
-              <a:rPr lang="en-US" sz="2800" dirty="0" smtClean="0">
+              <a:rPr lang="en-US" sz="2800" dirty="0">
                 <a:solidFill>
                   <a:schemeClr val="bg1"/>
                 </a:solidFill>
               </a:rPr>
-              <a:t>P</a:t>
-            </a:r>
-            <a:r>
-              <a:rPr lang="en-US" altLang="zh-CN" sz="2800" dirty="0" smtClean="0">
+              <a:t>Integrated </a:t>
+            </a:r>
+            <a:r>
+              <a:rPr lang="en-CA" sz="2800" dirty="0">
                 <a:solidFill>
                   <a:schemeClr val="bg1"/>
                 </a:solidFill>
               </a:rPr>
-              <a:t>reprocessing</a:t>
-            </a:r>
+              <a:t>Parallel Acceleration of Paths Searching</a:t>
+            </a:r>
+          </a:p>
+          <a:p>
             <a:endParaRPr lang="en-CA" sz="2800" dirty="0">
               <a:solidFill>
                 <a:schemeClr val="bg1"/>
@@ -11044,7 +11046,7 @@
           <a:p>
             <a:fld id="{049B54AE-E0CA-47A8-836E-86A3515991E5}" type="datetime1">
               <a:rPr lang="en-CA" smtClean="0"/>
-              <a:t>2015-05-02</a:t>
+              <a:t>2015-05-04</a:t>
             </a:fld>
             <a:endParaRPr lang="en-CA"/>
           </a:p>
@@ -12150,7 +12152,7 @@
           <a:p>
             <a:fld id="{049B54AE-E0CA-47A8-836E-86A3515991E5}" type="datetime1">
               <a:rPr lang="en-CA" smtClean="0"/>
-              <a:t>2015-05-02</a:t>
+              <a:t>2015-05-04</a:t>
             </a:fld>
             <a:endParaRPr lang="en-CA"/>
           </a:p>
@@ -12608,7 +12610,7 @@
           <a:p>
             <a:fld id="{DB95B0FB-F7EF-4DC6-930A-287826E433A5}" type="datetime1">
               <a:rPr lang="en-CA" smtClean="0"/>
-              <a:t>2015-05-02</a:t>
+              <a:t>2015-05-04</a:t>
             </a:fld>
             <a:endParaRPr lang="en-CA" dirty="0"/>
           </a:p>
@@ -12766,7 +12768,7 @@
           <a:p>
             <a:fld id="{DB95B0FB-F7EF-4DC6-930A-287826E433A5}" type="datetime1">
               <a:rPr lang="en-CA" smtClean="0"/>
-              <a:t>2015-05-02</a:t>
+              <a:t>2015-05-04</a:t>
             </a:fld>
             <a:endParaRPr lang="en-CA" dirty="0"/>
           </a:p>
@@ -13755,7 +13757,7 @@
           <a:p>
             <a:fld id="{47B43F21-5170-448B-B896-62ACDC8A033D}" type="datetime1">
               <a:rPr lang="en-CA" smtClean="0"/>
-              <a:t>2015-05-02</a:t>
+              <a:t>2015-05-04</a:t>
             </a:fld>
             <a:endParaRPr lang="en-CA"/>
           </a:p>
@@ -13913,7 +13915,7 @@
           <a:p>
             <a:fld id="{DB95B0FB-F7EF-4DC6-930A-287826E433A5}" type="datetime1">
               <a:rPr lang="en-CA" smtClean="0"/>
-              <a:t>2015-05-02</a:t>
+              <a:t>2015-05-04</a:t>
             </a:fld>
             <a:endParaRPr lang="en-CA" dirty="0"/>
           </a:p>
@@ -14189,7 +14191,7 @@
           <a:p>
             <a:fld id="{DB95B0FB-F7EF-4DC6-930A-287826E433A5}" type="datetime1">
               <a:rPr lang="en-CA" smtClean="0"/>
-              <a:t>2015-05-02</a:t>
+              <a:t>2015-05-04</a:t>
             </a:fld>
             <a:endParaRPr lang="en-CA" dirty="0"/>
           </a:p>
@@ -14663,7 +14665,7 @@
           <a:p>
             <a:fld id="{3B8AA9AD-8D18-47DD-90B5-F83BEBCEA139}" type="datetime1">
               <a:rPr lang="en-CA" smtClean="0"/>
-              <a:t>2015-05-02</a:t>
+              <a:t>2015-05-04</a:t>
             </a:fld>
             <a:endParaRPr lang="en-CA"/>
           </a:p>
@@ -15265,7 +15267,7 @@
           <a:p>
             <a:fld id="{D236E2CD-173A-496E-8CA7-67A0E62BE56F}" type="datetime1">
               <a:rPr lang="en-CA" smtClean="0"/>
-              <a:t>2015-05-02</a:t>
+              <a:t>2015-05-04</a:t>
             </a:fld>
             <a:endParaRPr lang="en-CA"/>
           </a:p>
@@ -15556,7 +15558,7 @@
           <a:p>
             <a:fld id="{DB95B0FB-F7EF-4DC6-930A-287826E433A5}" type="datetime1">
               <a:rPr lang="en-CA" smtClean="0"/>
-              <a:t>2015-05-02</a:t>
+              <a:t>2015-05-04</a:t>
             </a:fld>
             <a:endParaRPr lang="en-CA"/>
           </a:p>
@@ -15823,7 +15825,7 @@
           <a:p>
             <a:fld id="{DB95B0FB-F7EF-4DC6-930A-287826E433A5}" type="datetime1">
               <a:rPr lang="en-CA" smtClean="0"/>
-              <a:t>2015-05-02</a:t>
+              <a:t>2015-05-04</a:t>
             </a:fld>
             <a:endParaRPr lang="en-CA"/>
           </a:p>
@@ -16186,7 +16188,7 @@
           <a:p>
             <a:fld id="{9CC9CBF4-7E6E-43C5-A42B-D236C167BBF7}" type="datetime1">
               <a:rPr lang="en-CA" smtClean="0"/>
-              <a:t>2015-05-02</a:t>
+              <a:t>2015-05-04</a:t>
             </a:fld>
             <a:endParaRPr lang="en-CA"/>
           </a:p>
@@ -16441,7 +16443,7 @@
           <a:p>
             <a:fld id="{6DDA817C-091A-4D8F-AAC6-A261C24E466D}" type="datetime1">
               <a:rPr lang="en-CA" smtClean="0"/>
-              <a:t>2015-05-02</a:t>
+              <a:t>2015-05-04</a:t>
             </a:fld>
             <a:endParaRPr lang="en-CA"/>
           </a:p>
@@ -16723,7 +16725,7 @@
           <a:p>
             <a:fld id="{049B54AE-E0CA-47A8-836E-86A3515991E5}" type="datetime1">
               <a:rPr lang="en-CA" smtClean="0"/>
-              <a:t>2015-05-02</a:t>
+              <a:t>2015-05-04</a:t>
             </a:fld>
             <a:endParaRPr lang="en-CA"/>
           </a:p>
@@ -16999,7 +17001,7 @@
           <a:p>
             <a:fld id="{DB95B0FB-F7EF-4DC6-930A-287826E433A5}" type="datetime1">
               <a:rPr lang="en-CA" smtClean="0"/>
-              <a:t>2015-05-02</a:t>
+              <a:t>2015-05-04</a:t>
             </a:fld>
             <a:endParaRPr lang="en-CA" dirty="0"/>
           </a:p>
@@ -18686,7 +18688,7 @@
           <a:p>
             <a:fld id="{049B54AE-E0CA-47A8-836E-86A3515991E5}" type="datetime1">
               <a:rPr lang="en-CA" smtClean="0"/>
-              <a:t>2015-05-02</a:t>
+              <a:t>2015-05-04</a:t>
             </a:fld>
             <a:endParaRPr lang="en-CA"/>
           </a:p>

</xml_diff>